<commit_message>
Added first line on grpah config
</commit_message>
<xml_diff>
--- a/src/background/vertex_map.pptx
+++ b/src/background/vertex_map.pptx
@@ -104,6 +104,11 @@
       </a:defRPr>
     </a:lvl9pPr>
   </p:defaultTextStyle>
+  <p:extLst>
+    <p:ext uri="{EFAFB233-063F-42B5-8137-9DF3F51BA10A}">
+      <p15:sldGuideLst xmlns:p15="http://schemas.microsoft.com/office/powerpoint/2012/main"/>
+    </p:ext>
+  </p:extLst>
 </p:presentation>
 </file>
 
@@ -254,7 +259,7 @@
           <a:p>
             <a:fld id="{83A58605-BD60-4350-B762-2AEF8E34E994}" type="datetimeFigureOut">
               <a:rPr lang="en-US" smtClean="0"/>
-              <a:t>4/21/2022</a:t>
+              <a:t>4/21/22</a:t>
             </a:fld>
             <a:endParaRPr lang="en-US"/>
           </a:p>
@@ -452,7 +457,7 @@
           <a:p>
             <a:fld id="{83A58605-BD60-4350-B762-2AEF8E34E994}" type="datetimeFigureOut">
               <a:rPr lang="en-US" smtClean="0"/>
-              <a:t>4/21/2022</a:t>
+              <a:t>4/21/22</a:t>
             </a:fld>
             <a:endParaRPr lang="en-US"/>
           </a:p>
@@ -660,7 +665,7 @@
           <a:p>
             <a:fld id="{83A58605-BD60-4350-B762-2AEF8E34E994}" type="datetimeFigureOut">
               <a:rPr lang="en-US" smtClean="0"/>
-              <a:t>4/21/2022</a:t>
+              <a:t>4/21/22</a:t>
             </a:fld>
             <a:endParaRPr lang="en-US"/>
           </a:p>
@@ -858,7 +863,7 @@
           <a:p>
             <a:fld id="{83A58605-BD60-4350-B762-2AEF8E34E994}" type="datetimeFigureOut">
               <a:rPr lang="en-US" smtClean="0"/>
-              <a:t>4/21/2022</a:t>
+              <a:t>4/21/22</a:t>
             </a:fld>
             <a:endParaRPr lang="en-US"/>
           </a:p>
@@ -1133,7 +1138,7 @@
           <a:p>
             <a:fld id="{83A58605-BD60-4350-B762-2AEF8E34E994}" type="datetimeFigureOut">
               <a:rPr lang="en-US" smtClean="0"/>
-              <a:t>4/21/2022</a:t>
+              <a:t>4/21/22</a:t>
             </a:fld>
             <a:endParaRPr lang="en-US"/>
           </a:p>
@@ -1398,7 +1403,7 @@
           <a:p>
             <a:fld id="{83A58605-BD60-4350-B762-2AEF8E34E994}" type="datetimeFigureOut">
               <a:rPr lang="en-US" smtClean="0"/>
-              <a:t>4/21/2022</a:t>
+              <a:t>4/21/22</a:t>
             </a:fld>
             <a:endParaRPr lang="en-US"/>
           </a:p>
@@ -1810,7 +1815,7 @@
           <a:p>
             <a:fld id="{83A58605-BD60-4350-B762-2AEF8E34E994}" type="datetimeFigureOut">
               <a:rPr lang="en-US" smtClean="0"/>
-              <a:t>4/21/2022</a:t>
+              <a:t>4/21/22</a:t>
             </a:fld>
             <a:endParaRPr lang="en-US"/>
           </a:p>
@@ -1951,7 +1956,7 @@
           <a:p>
             <a:fld id="{83A58605-BD60-4350-B762-2AEF8E34E994}" type="datetimeFigureOut">
               <a:rPr lang="en-US" smtClean="0"/>
-              <a:t>4/21/2022</a:t>
+              <a:t>4/21/22</a:t>
             </a:fld>
             <a:endParaRPr lang="en-US"/>
           </a:p>
@@ -2064,7 +2069,7 @@
           <a:p>
             <a:fld id="{83A58605-BD60-4350-B762-2AEF8E34E994}" type="datetimeFigureOut">
               <a:rPr lang="en-US" smtClean="0"/>
-              <a:t>4/21/2022</a:t>
+              <a:t>4/21/22</a:t>
             </a:fld>
             <a:endParaRPr lang="en-US"/>
           </a:p>
@@ -2375,7 +2380,7 @@
           <a:p>
             <a:fld id="{83A58605-BD60-4350-B762-2AEF8E34E994}" type="datetimeFigureOut">
               <a:rPr lang="en-US" smtClean="0"/>
-              <a:t>4/21/2022</a:t>
+              <a:t>4/21/22</a:t>
             </a:fld>
             <a:endParaRPr lang="en-US"/>
           </a:p>
@@ -2663,7 +2668,7 @@
           <a:p>
             <a:fld id="{83A58605-BD60-4350-B762-2AEF8E34E994}" type="datetimeFigureOut">
               <a:rPr lang="en-US" smtClean="0"/>
-              <a:t>4/21/2022</a:t>
+              <a:t>4/21/22</a:t>
             </a:fld>
             <a:endParaRPr lang="en-US"/>
           </a:p>
@@ -2904,7 +2909,7 @@
           <a:p>
             <a:fld id="{83A58605-BD60-4350-B762-2AEF8E34E994}" type="datetimeFigureOut">
               <a:rPr lang="en-US" smtClean="0"/>
-              <a:t>4/21/2022</a:t>
+              <a:t>4/21/22</a:t>
             </a:fld>
             <a:endParaRPr lang="en-US"/>
           </a:p>
@@ -3524,7 +3529,7 @@
             <a:pPr algn="ctr"/>
             <a:r>
               <a:rPr lang="en-US" sz="400" dirty="0"/>
-              <a:t>( -486, -260)</a:t>
+              <a:t>( -486, -258)</a:t>
             </a:r>
           </a:p>
         </p:txBody>
@@ -3585,7 +3590,7 @@
             <a:pPr algn="ctr"/>
             <a:r>
               <a:rPr lang="en-US" sz="400" dirty="0"/>
-              <a:t>( -580, -260)</a:t>
+              <a:t>( -586, -258)</a:t>
             </a:r>
           </a:p>
         </p:txBody>
@@ -3646,7 +3651,7 @@
             <a:pPr algn="ctr"/>
             <a:r>
               <a:rPr lang="en-US" sz="400" dirty="0"/>
-              <a:t>( -580, -143)</a:t>
+              <a:t>( -586, -143)</a:t>
             </a:r>
           </a:p>
         </p:txBody>
@@ -3707,7 +3712,7 @@
             <a:pPr algn="ctr"/>
             <a:r>
               <a:rPr lang="en-US" sz="400" dirty="0"/>
-              <a:t>( -580, -26)</a:t>
+              <a:t>( -586, -26)</a:t>
             </a:r>
           </a:p>
         </p:txBody>
@@ -3768,7 +3773,7 @@
             <a:pPr algn="ctr"/>
             <a:r>
               <a:rPr lang="en-US" sz="400" dirty="0"/>
-              <a:t>( -580, 86)</a:t>
+              <a:t>( -586, 86)</a:t>
             </a:r>
           </a:p>
         </p:txBody>
@@ -4744,7 +4749,7 @@
             <a:pPr algn="ctr"/>
             <a:r>
               <a:rPr lang="en-US" sz="400" dirty="0"/>
-              <a:t>( -580, 198)</a:t>
+              <a:t>( -586, 198)</a:t>
             </a:r>
           </a:p>
         </p:txBody>
@@ -4805,7 +4810,7 @@
             <a:pPr algn="ctr"/>
             <a:r>
               <a:rPr lang="en-US" sz="400" dirty="0"/>
-              <a:t>( -426, -260)</a:t>
+              <a:t>( -426, -258)</a:t>
             </a:r>
           </a:p>
         </p:txBody>
@@ -4866,7 +4871,7 @@
             <a:pPr algn="ctr"/>
             <a:r>
               <a:rPr lang="en-US" sz="400" dirty="0"/>
-              <a:t>( -306, -260)</a:t>
+              <a:t>( -306, -258)</a:t>
             </a:r>
           </a:p>
         </p:txBody>
@@ -4927,7 +4932,7 @@
             <a:pPr algn="ctr"/>
             <a:r>
               <a:rPr lang="en-US" sz="400" dirty="0"/>
-              <a:t>( -380, -260)</a:t>
+              <a:t>( -380, -258)</a:t>
             </a:r>
           </a:p>
         </p:txBody>
@@ -4988,7 +4993,7 @@
             <a:pPr algn="ctr"/>
             <a:r>
               <a:rPr lang="en-US" sz="400" dirty="0"/>
-              <a:t>( -130, -260)</a:t>
+              <a:t>( -130, -258)</a:t>
             </a:r>
           </a:p>
         </p:txBody>
@@ -5049,7 +5054,7 @@
             <a:pPr algn="ctr"/>
             <a:r>
               <a:rPr lang="en-US" sz="400" dirty="0"/>
-              <a:t>( -186, -260)</a:t>
+              <a:t>( -186, -258)</a:t>
             </a:r>
           </a:p>
         </p:txBody>
@@ -5110,7 +5115,7 @@
             <a:pPr algn="ctr"/>
             <a:r>
               <a:rPr lang="en-US" sz="400" dirty="0"/>
-              <a:t>( 50, -260)</a:t>
+              <a:t>( 50, -258)</a:t>
             </a:r>
           </a:p>
         </p:txBody>
@@ -5171,7 +5176,7 @@
             <a:pPr algn="ctr"/>
             <a:r>
               <a:rPr lang="en-US" sz="400" dirty="0"/>
-              <a:t>( 173, -260)</a:t>
+              <a:t>( 173, -258)</a:t>
             </a:r>
           </a:p>
         </p:txBody>
@@ -5232,7 +5237,7 @@
             <a:pPr algn="ctr"/>
             <a:r>
               <a:rPr lang="en-US" sz="400" dirty="0"/>
-              <a:t>( 106, -260)</a:t>
+              <a:t>( 106, -258)</a:t>
             </a:r>
           </a:p>
         </p:txBody>
@@ -5293,7 +5298,7 @@
             <a:pPr algn="ctr"/>
             <a:r>
               <a:rPr lang="en-US" sz="400" dirty="0"/>
-              <a:t>( 233, -260)</a:t>
+              <a:t>( 233, -258)</a:t>
             </a:r>
           </a:p>
         </p:txBody>
@@ -5354,7 +5359,7 @@
             <a:pPr algn="ctr"/>
             <a:r>
               <a:rPr lang="en-US" sz="400" dirty="0"/>
-              <a:t>( 350, -260)</a:t>
+              <a:t>( 350, -258)</a:t>
             </a:r>
           </a:p>
         </p:txBody>
@@ -5415,7 +5420,7 @@
             <a:pPr algn="ctr"/>
             <a:r>
               <a:rPr lang="en-US" sz="400" dirty="0"/>
-              <a:t>( 293, -260)</a:t>
+              <a:t>( 293, -258)</a:t>
             </a:r>
           </a:p>
         </p:txBody>
@@ -8404,7 +8409,7 @@
             <a:pPr algn="ctr"/>
             <a:r>
               <a:rPr lang="en-US" sz="400" dirty="0"/>
-              <a:t>( -580, 273)</a:t>
+              <a:t>( -586, 273)</a:t>
             </a:r>
           </a:p>
         </p:txBody>
@@ -9494,7 +9499,7 @@
             <a:pPr algn="ctr"/>
             <a:r>
               <a:rPr lang="en-US" sz="400" dirty="0"/>
-              <a:t>( -486, -260)</a:t>
+              <a:t>( -486, -252)</a:t>
             </a:r>
           </a:p>
         </p:txBody>
@@ -9551,7 +9556,7 @@
             <a:pPr algn="ctr"/>
             <a:r>
               <a:rPr lang="en-US" sz="400" dirty="0"/>
-              <a:t>( -580, -260)</a:t>
+              <a:t>( -586, -252)</a:t>
             </a:r>
           </a:p>
         </p:txBody>
@@ -9608,7 +9613,7 @@
             <a:pPr algn="ctr"/>
             <a:r>
               <a:rPr lang="en-US" sz="400" dirty="0"/>
-              <a:t>( -580, -143)</a:t>
+              <a:t>( -586, -143)</a:t>
             </a:r>
           </a:p>
         </p:txBody>
@@ -9665,7 +9670,7 @@
             <a:pPr algn="ctr"/>
             <a:r>
               <a:rPr lang="en-US" sz="400" dirty="0"/>
-              <a:t>( -580, -26)</a:t>
+              <a:t>( -586, -26)</a:t>
             </a:r>
           </a:p>
         </p:txBody>
@@ -9722,7 +9727,7 @@
             <a:pPr algn="ctr"/>
             <a:r>
               <a:rPr lang="en-US" sz="400" dirty="0"/>
-              <a:t>( -580, 86)</a:t>
+              <a:t>( -586, 86)</a:t>
             </a:r>
           </a:p>
         </p:txBody>
@@ -10634,7 +10639,7 @@
             <a:pPr algn="ctr"/>
             <a:r>
               <a:rPr lang="en-US" sz="400" dirty="0"/>
-              <a:t>( -580, 198)</a:t>
+              <a:t>( -586, 198)</a:t>
             </a:r>
           </a:p>
         </p:txBody>
@@ -10691,7 +10696,7 @@
             <a:pPr algn="ctr"/>
             <a:r>
               <a:rPr lang="en-US" sz="400" dirty="0"/>
-              <a:t>( -426, -260)</a:t>
+              <a:t>( -426, -252)</a:t>
             </a:r>
           </a:p>
         </p:txBody>
@@ -10748,7 +10753,7 @@
             <a:pPr algn="ctr"/>
             <a:r>
               <a:rPr lang="en-US" sz="400" dirty="0"/>
-              <a:t>( -306, -260)</a:t>
+              <a:t>( -306, -252)</a:t>
             </a:r>
           </a:p>
         </p:txBody>
@@ -10805,7 +10810,7 @@
             <a:pPr algn="ctr"/>
             <a:r>
               <a:rPr lang="en-US" sz="400" dirty="0"/>
-              <a:t>( -380, -260)</a:t>
+              <a:t>( -380, -252)</a:t>
             </a:r>
           </a:p>
         </p:txBody>
@@ -10862,7 +10867,7 @@
             <a:pPr algn="ctr"/>
             <a:r>
               <a:rPr lang="en-US" sz="400" dirty="0"/>
-              <a:t>( -130, -260)</a:t>
+              <a:t>( -130, -252)</a:t>
             </a:r>
           </a:p>
         </p:txBody>
@@ -10919,7 +10924,7 @@
             <a:pPr algn="ctr"/>
             <a:r>
               <a:rPr lang="en-US" sz="400" dirty="0"/>
-              <a:t>( -186, -260)</a:t>
+              <a:t>( -186, -252)</a:t>
             </a:r>
           </a:p>
         </p:txBody>
@@ -10976,7 +10981,7 @@
             <a:pPr algn="ctr"/>
             <a:r>
               <a:rPr lang="en-US" sz="400" dirty="0"/>
-              <a:t>( 50, -260)</a:t>
+              <a:t>( 50, -252)</a:t>
             </a:r>
           </a:p>
         </p:txBody>
@@ -11033,7 +11038,7 @@
             <a:pPr algn="ctr"/>
             <a:r>
               <a:rPr lang="en-US" sz="400" dirty="0"/>
-              <a:t>( 173, -260)</a:t>
+              <a:t>( 173, -252)</a:t>
             </a:r>
           </a:p>
         </p:txBody>
@@ -11090,7 +11095,7 @@
             <a:pPr algn="ctr"/>
             <a:r>
               <a:rPr lang="en-US" sz="400" dirty="0"/>
-              <a:t>( 106, -260)</a:t>
+              <a:t>( 106, -252)</a:t>
             </a:r>
           </a:p>
         </p:txBody>
@@ -11147,7 +11152,7 @@
             <a:pPr algn="ctr"/>
             <a:r>
               <a:rPr lang="en-US" sz="400" dirty="0"/>
-              <a:t>( 233, -260)</a:t>
+              <a:t>( 233, -252)</a:t>
             </a:r>
           </a:p>
         </p:txBody>
@@ -11204,8 +11209,13 @@
             <a:pPr algn="ctr"/>
             <a:r>
               <a:rPr lang="en-US" sz="400" dirty="0"/>
-              <a:t>( 350, -260)</a:t>
-            </a:r>
+              <a:t>( 350, </a:t>
+            </a:r>
+            <a:r>
+              <a:rPr lang="en-US" sz="400"/>
+              <a:t>-252)</a:t>
+            </a:r>
+            <a:endParaRPr lang="en-US" sz="400" dirty="0"/>
           </a:p>
         </p:txBody>
       </p:sp>
@@ -11261,7 +11271,7 @@
             <a:pPr algn="ctr"/>
             <a:r>
               <a:rPr lang="en-US" sz="400" dirty="0"/>
-              <a:t>( 293, -260)</a:t>
+              <a:t>( 293, -252)</a:t>
             </a:r>
           </a:p>
         </p:txBody>

</xml_diff>

<commit_message>
added 2nd level to graph
</commit_message>
<xml_diff>
--- a/src/background/vertex_map.pptx
+++ b/src/background/vertex_map.pptx
@@ -3590,7 +3590,7 @@
             <a:pPr algn="ctr"/>
             <a:r>
               <a:rPr lang="en-US" sz="400" dirty="0"/>
-              <a:t>( -586, -258)</a:t>
+              <a:t>( -583, -258)</a:t>
             </a:r>
           </a:p>
         </p:txBody>
@@ -3651,7 +3651,7 @@
             <a:pPr algn="ctr"/>
             <a:r>
               <a:rPr lang="en-US" sz="400" dirty="0"/>
-              <a:t>( -586, -143)</a:t>
+              <a:t>( -583, -143)</a:t>
             </a:r>
           </a:p>
         </p:txBody>
@@ -3712,7 +3712,7 @@
             <a:pPr algn="ctr"/>
             <a:r>
               <a:rPr lang="en-US" sz="400" dirty="0"/>
-              <a:t>( -586, -26)</a:t>
+              <a:t>( -583, -26)</a:t>
             </a:r>
           </a:p>
         </p:txBody>
@@ -3773,7 +3773,7 @@
             <a:pPr algn="ctr"/>
             <a:r>
               <a:rPr lang="en-US" sz="400" dirty="0"/>
-              <a:t>( -586, 86)</a:t>
+              <a:t>( -583, 86)</a:t>
             </a:r>
           </a:p>
         </p:txBody>
@@ -4749,7 +4749,7 @@
             <a:pPr algn="ctr"/>
             <a:r>
               <a:rPr lang="en-US" sz="400" dirty="0"/>
-              <a:t>( -586, 198)</a:t>
+              <a:t>( -583, 198)</a:t>
             </a:r>
           </a:p>
         </p:txBody>
@@ -8409,7 +8409,7 @@
             <a:pPr algn="ctr"/>
             <a:r>
               <a:rPr lang="en-US" sz="400" dirty="0"/>
-              <a:t>( -586, 273)</a:t>
+              <a:t>( -583, 273)</a:t>
             </a:r>
           </a:p>
         </p:txBody>
@@ -9442,7 +9442,7 @@
             <a:pPr algn="ctr"/>
             <a:r>
               <a:rPr lang="en-US" sz="400" dirty="0"/>
-              <a:t>( -486, -143)</a:t>
+              <a:t>( -486, -137)</a:t>
             </a:r>
           </a:p>
         </p:txBody>
@@ -9556,7 +9556,7 @@
             <a:pPr algn="ctr"/>
             <a:r>
               <a:rPr lang="en-US" sz="400" dirty="0"/>
-              <a:t>( -586, -252)</a:t>
+              <a:t>( -583, -252)</a:t>
             </a:r>
           </a:p>
         </p:txBody>
@@ -9613,7 +9613,7 @@
             <a:pPr algn="ctr"/>
             <a:r>
               <a:rPr lang="en-US" sz="400" dirty="0"/>
-              <a:t>( -586, -143)</a:t>
+              <a:t>( -583, -137)</a:t>
             </a:r>
           </a:p>
         </p:txBody>
@@ -9670,7 +9670,7 @@
             <a:pPr algn="ctr"/>
             <a:r>
               <a:rPr lang="en-US" sz="400" dirty="0"/>
-              <a:t>( -586, -26)</a:t>
+              <a:t>( -583, -26)</a:t>
             </a:r>
           </a:p>
         </p:txBody>
@@ -9727,7 +9727,7 @@
             <a:pPr algn="ctr"/>
             <a:r>
               <a:rPr lang="en-US" sz="400" dirty="0"/>
-              <a:t>( -586, 86)</a:t>
+              <a:t>( -583, 86)</a:t>
             </a:r>
           </a:p>
         </p:txBody>
@@ -9784,7 +9784,7 @@
             <a:pPr algn="ctr"/>
             <a:r>
               <a:rPr lang="en-US" sz="400" dirty="0"/>
-              <a:t>( -426, -143)</a:t>
+              <a:t>( -426, -137)</a:t>
             </a:r>
           </a:p>
         </p:txBody>
@@ -9841,7 +9841,7 @@
             <a:pPr algn="ctr"/>
             <a:r>
               <a:rPr lang="en-US" sz="400" dirty="0"/>
-              <a:t>( -306, -143)</a:t>
+              <a:t>( -306, -137)</a:t>
             </a:r>
           </a:p>
         </p:txBody>
@@ -9898,7 +9898,7 @@
             <a:pPr algn="ctr"/>
             <a:r>
               <a:rPr lang="en-US" sz="400" dirty="0"/>
-              <a:t>( -380, -143)</a:t>
+              <a:t>( -380, -137)</a:t>
             </a:r>
           </a:p>
         </p:txBody>
@@ -9955,7 +9955,7 @@
             <a:pPr algn="ctr"/>
             <a:r>
               <a:rPr lang="en-US" sz="400" dirty="0"/>
-              <a:t>( -253, -143)</a:t>
+              <a:t>( -253, -137)</a:t>
             </a:r>
           </a:p>
         </p:txBody>
@@ -10012,7 +10012,7 @@
             <a:pPr algn="ctr"/>
             <a:r>
               <a:rPr lang="en-US" sz="400" dirty="0"/>
-              <a:t>( -130, -143)</a:t>
+              <a:t>( -130, -137)</a:t>
             </a:r>
           </a:p>
         </p:txBody>
@@ -10069,7 +10069,7 @@
             <a:pPr algn="ctr"/>
             <a:r>
               <a:rPr lang="en-US" sz="400" dirty="0"/>
-              <a:t>( -186, -143)</a:t>
+              <a:t>( -186, -137)</a:t>
             </a:r>
           </a:p>
         </p:txBody>
@@ -10126,7 +10126,7 @@
             <a:pPr algn="ctr"/>
             <a:r>
               <a:rPr lang="en-US" sz="400" dirty="0"/>
-              <a:t>( 50, -143)</a:t>
+              <a:t>( 50, -137)</a:t>
             </a:r>
           </a:p>
         </p:txBody>
@@ -10183,7 +10183,7 @@
             <a:pPr algn="ctr"/>
             <a:r>
               <a:rPr lang="en-US" sz="400" dirty="0"/>
-              <a:t>( 173, -143)</a:t>
+              <a:t>( 173, -137)</a:t>
             </a:r>
           </a:p>
         </p:txBody>
@@ -10240,7 +10240,7 @@
             <a:pPr algn="ctr"/>
             <a:r>
               <a:rPr lang="en-US" sz="400" dirty="0"/>
-              <a:t>( 106, -143)</a:t>
+              <a:t>( 106, -137)</a:t>
             </a:r>
           </a:p>
         </p:txBody>
@@ -10297,7 +10297,7 @@
             <a:pPr algn="ctr"/>
             <a:r>
               <a:rPr lang="en-US" sz="400" dirty="0"/>
-              <a:t>( 233, -143)</a:t>
+              <a:t>( 233, -137)</a:t>
             </a:r>
           </a:p>
         </p:txBody>
@@ -10354,7 +10354,7 @@
             <a:pPr algn="ctr"/>
             <a:r>
               <a:rPr lang="en-US" sz="400" dirty="0"/>
-              <a:t>( 350, -143)</a:t>
+              <a:t>( 350, -137)</a:t>
             </a:r>
           </a:p>
         </p:txBody>
@@ -10411,7 +10411,7 @@
             <a:pPr algn="ctr"/>
             <a:r>
               <a:rPr lang="en-US" sz="400" dirty="0"/>
-              <a:t>( 293, -143)</a:t>
+              <a:t>( 293, -137)</a:t>
             </a:r>
           </a:p>
         </p:txBody>
@@ -10468,7 +10468,7 @@
             <a:pPr algn="ctr"/>
             <a:r>
               <a:rPr lang="en-US" sz="400" dirty="0"/>
-              <a:t>( 406, -143)</a:t>
+              <a:t>( 406, -137)</a:t>
             </a:r>
           </a:p>
         </p:txBody>
@@ -10525,7 +10525,7 @@
             <a:pPr algn="ctr"/>
             <a:r>
               <a:rPr lang="en-US" sz="400" dirty="0"/>
-              <a:t>( 466, -143)</a:t>
+              <a:t>( 466, -137)</a:t>
             </a:r>
           </a:p>
         </p:txBody>
@@ -10582,7 +10582,7 @@
             <a:pPr algn="ctr"/>
             <a:r>
               <a:rPr lang="en-US" sz="400" dirty="0"/>
-              <a:t>( 526, -143)</a:t>
+              <a:t>( 526, -137)</a:t>
             </a:r>
           </a:p>
         </p:txBody>
@@ -10639,7 +10639,7 @@
             <a:pPr algn="ctr"/>
             <a:r>
               <a:rPr lang="en-US" sz="400" dirty="0"/>
-              <a:t>( -586, 198)</a:t>
+              <a:t>( -583, 198)</a:t>
             </a:r>
           </a:p>
         </p:txBody>
@@ -11209,13 +11209,8 @@
             <a:pPr algn="ctr"/>
             <a:r>
               <a:rPr lang="en-US" sz="400" dirty="0"/>
-              <a:t>( 350, </a:t>
-            </a:r>
-            <a:r>
-              <a:rPr lang="en-US" sz="400"/>
-              <a:t>-252)</a:t>
-            </a:r>
-            <a:endParaRPr lang="en-US" sz="400" dirty="0"/>
+              <a:t>( 350, -252)</a:t>
+            </a:r>
           </a:p>
         </p:txBody>
       </p:sp>

</xml_diff>

<commit_message>
Work on graph config
</commit_message>
<xml_diff>
--- a/src/background/vertex_map.pptx
+++ b/src/background/vertex_map.pptx
@@ -259,7 +259,7 @@
           <a:p>
             <a:fld id="{83A58605-BD60-4350-B762-2AEF8E34E994}" type="datetimeFigureOut">
               <a:rPr lang="en-US" smtClean="0"/>
-              <a:t>4/23/22</a:t>
+              <a:t>4/29/22</a:t>
             </a:fld>
             <a:endParaRPr lang="en-US"/>
           </a:p>
@@ -457,7 +457,7 @@
           <a:p>
             <a:fld id="{83A58605-BD60-4350-B762-2AEF8E34E994}" type="datetimeFigureOut">
               <a:rPr lang="en-US" smtClean="0"/>
-              <a:t>4/23/22</a:t>
+              <a:t>4/29/22</a:t>
             </a:fld>
             <a:endParaRPr lang="en-US"/>
           </a:p>
@@ -665,7 +665,7 @@
           <a:p>
             <a:fld id="{83A58605-BD60-4350-B762-2AEF8E34E994}" type="datetimeFigureOut">
               <a:rPr lang="en-US" smtClean="0"/>
-              <a:t>4/23/22</a:t>
+              <a:t>4/29/22</a:t>
             </a:fld>
             <a:endParaRPr lang="en-US"/>
           </a:p>
@@ -863,7 +863,7 @@
           <a:p>
             <a:fld id="{83A58605-BD60-4350-B762-2AEF8E34E994}" type="datetimeFigureOut">
               <a:rPr lang="en-US" smtClean="0"/>
-              <a:t>4/23/22</a:t>
+              <a:t>4/29/22</a:t>
             </a:fld>
             <a:endParaRPr lang="en-US"/>
           </a:p>
@@ -1138,7 +1138,7 @@
           <a:p>
             <a:fld id="{83A58605-BD60-4350-B762-2AEF8E34E994}" type="datetimeFigureOut">
               <a:rPr lang="en-US" smtClean="0"/>
-              <a:t>4/23/22</a:t>
+              <a:t>4/29/22</a:t>
             </a:fld>
             <a:endParaRPr lang="en-US"/>
           </a:p>
@@ -1403,7 +1403,7 @@
           <a:p>
             <a:fld id="{83A58605-BD60-4350-B762-2AEF8E34E994}" type="datetimeFigureOut">
               <a:rPr lang="en-US" smtClean="0"/>
-              <a:t>4/23/22</a:t>
+              <a:t>4/29/22</a:t>
             </a:fld>
             <a:endParaRPr lang="en-US"/>
           </a:p>
@@ -1815,7 +1815,7 @@
           <a:p>
             <a:fld id="{83A58605-BD60-4350-B762-2AEF8E34E994}" type="datetimeFigureOut">
               <a:rPr lang="en-US" smtClean="0"/>
-              <a:t>4/23/22</a:t>
+              <a:t>4/29/22</a:t>
             </a:fld>
             <a:endParaRPr lang="en-US"/>
           </a:p>
@@ -1956,7 +1956,7 @@
           <a:p>
             <a:fld id="{83A58605-BD60-4350-B762-2AEF8E34E994}" type="datetimeFigureOut">
               <a:rPr lang="en-US" smtClean="0"/>
-              <a:t>4/23/22</a:t>
+              <a:t>4/29/22</a:t>
             </a:fld>
             <a:endParaRPr lang="en-US"/>
           </a:p>
@@ -2069,7 +2069,7 @@
           <a:p>
             <a:fld id="{83A58605-BD60-4350-B762-2AEF8E34E994}" type="datetimeFigureOut">
               <a:rPr lang="en-US" smtClean="0"/>
-              <a:t>4/23/22</a:t>
+              <a:t>4/29/22</a:t>
             </a:fld>
             <a:endParaRPr lang="en-US"/>
           </a:p>
@@ -2380,7 +2380,7 @@
           <a:p>
             <a:fld id="{83A58605-BD60-4350-B762-2AEF8E34E994}" type="datetimeFigureOut">
               <a:rPr lang="en-US" smtClean="0"/>
-              <a:t>4/23/22</a:t>
+              <a:t>4/29/22</a:t>
             </a:fld>
             <a:endParaRPr lang="en-US"/>
           </a:p>
@@ -2668,7 +2668,7 @@
           <a:p>
             <a:fld id="{83A58605-BD60-4350-B762-2AEF8E34E994}" type="datetimeFigureOut">
               <a:rPr lang="en-US" smtClean="0"/>
-              <a:t>4/23/22</a:t>
+              <a:t>4/29/22</a:t>
             </a:fld>
             <a:endParaRPr lang="en-US"/>
           </a:p>
@@ -2909,7 +2909,7 @@
           <a:p>
             <a:fld id="{83A58605-BD60-4350-B762-2AEF8E34E994}" type="datetimeFigureOut">
               <a:rPr lang="en-US" smtClean="0"/>
-              <a:t>4/23/22</a:t>
+              <a:t>4/29/22</a:t>
             </a:fld>
             <a:endParaRPr lang="en-US"/>
           </a:p>
@@ -3722,7 +3722,7 @@
             <a:pPr algn="ctr"/>
             <a:r>
               <a:rPr lang="en-US" sz="400" dirty="0"/>
-              <a:t>( -583, -26)</a:t>
+              <a:t>( -583, -31)</a:t>
             </a:r>
           </a:p>
         </p:txBody>
@@ -3966,7 +3966,7 @@
             <a:pPr algn="ctr"/>
             <a:r>
               <a:rPr lang="en-US" sz="400" dirty="0"/>
-              <a:t>( -380, -143)</a:t>
+              <a:t>( -364, -143)</a:t>
             </a:r>
           </a:p>
         </p:txBody>
@@ -4027,7 +4027,7 @@
             <a:pPr algn="ctr"/>
             <a:r>
               <a:rPr lang="en-US" sz="400" dirty="0"/>
-              <a:t>( -253, -143)</a:t>
+              <a:t>( -248, -143)</a:t>
             </a:r>
           </a:p>
         </p:txBody>
@@ -4149,7 +4149,7 @@
             <a:pPr algn="ctr"/>
             <a:r>
               <a:rPr lang="en-US" sz="400" dirty="0"/>
-              <a:t>( -186, -143)</a:t>
+              <a:t>( -189, -143)</a:t>
             </a:r>
           </a:p>
         </p:txBody>
@@ -4210,7 +4210,7 @@
             <a:pPr algn="ctr"/>
             <a:r>
               <a:rPr lang="en-US" sz="400" dirty="0"/>
-              <a:t>( 50, -143)</a:t>
+              <a:t>( 45, -143)</a:t>
             </a:r>
           </a:p>
         </p:txBody>
@@ -4332,7 +4332,7 @@
             <a:pPr algn="ctr"/>
             <a:r>
               <a:rPr lang="en-US" sz="400" dirty="0"/>
-              <a:t>( 106, -143)</a:t>
+              <a:t>( 108, -143)</a:t>
             </a:r>
           </a:p>
         </p:txBody>
@@ -4393,7 +4393,7 @@
             <a:pPr algn="ctr"/>
             <a:r>
               <a:rPr lang="en-US" sz="400" dirty="0"/>
-              <a:t>( 233, -143)</a:t>
+              <a:t>( 230, -143)</a:t>
             </a:r>
           </a:p>
         </p:txBody>
@@ -4515,7 +4515,7 @@
             <a:pPr algn="ctr"/>
             <a:r>
               <a:rPr lang="en-US" sz="400" dirty="0"/>
-              <a:t>( 293, -143)</a:t>
+              <a:t>( 290, -143)</a:t>
             </a:r>
           </a:p>
         </p:txBody>
@@ -4942,7 +4942,7 @@
             <a:pPr algn="ctr"/>
             <a:r>
               <a:rPr lang="en-US" sz="400" dirty="0"/>
-              <a:t>( -380, -258)</a:t>
+              <a:t>( -364, -258)</a:t>
             </a:r>
           </a:p>
         </p:txBody>
@@ -5064,7 +5064,7 @@
             <a:pPr algn="ctr"/>
             <a:r>
               <a:rPr lang="en-US" sz="400" dirty="0"/>
-              <a:t>( -186, -258)</a:t>
+              <a:t>( -189, -258)</a:t>
             </a:r>
           </a:p>
         </p:txBody>
@@ -5125,7 +5125,7 @@
             <a:pPr algn="ctr"/>
             <a:r>
               <a:rPr lang="en-US" sz="400" dirty="0"/>
-              <a:t>( 50, -258)</a:t>
+              <a:t>( 45, -258)</a:t>
             </a:r>
           </a:p>
         </p:txBody>
@@ -5247,7 +5247,7 @@
             <a:pPr algn="ctr"/>
             <a:r>
               <a:rPr lang="en-US" sz="400" dirty="0"/>
-              <a:t>( 106, -258)</a:t>
+              <a:t>( 108, -258)</a:t>
             </a:r>
           </a:p>
         </p:txBody>
@@ -5308,7 +5308,7 @@
             <a:pPr algn="ctr"/>
             <a:r>
               <a:rPr lang="en-US" sz="400" dirty="0"/>
-              <a:t>( 233, -258)</a:t>
+              <a:t>( 230, -258)</a:t>
             </a:r>
           </a:p>
         </p:txBody>
@@ -5430,7 +5430,7 @@
             <a:pPr algn="ctr"/>
             <a:r>
               <a:rPr lang="en-US" sz="400" dirty="0"/>
-              <a:t>( 293, -258)</a:t>
+              <a:t>( 290, -258)</a:t>
             </a:r>
           </a:p>
         </p:txBody>
@@ -5491,7 +5491,7 @@
             <a:pPr algn="ctr"/>
             <a:r>
               <a:rPr lang="en-US" sz="400" dirty="0"/>
-              <a:t>( -486, -26)</a:t>
+              <a:t>( -486, -31)</a:t>
             </a:r>
           </a:p>
         </p:txBody>
@@ -5552,7 +5552,7 @@
             <a:pPr algn="ctr"/>
             <a:r>
               <a:rPr lang="en-US" sz="400" dirty="0"/>
-              <a:t>( -426, -26)</a:t>
+              <a:t>( -426, -31)</a:t>
             </a:r>
           </a:p>
         </p:txBody>
@@ -5613,7 +5613,7 @@
             <a:pPr algn="ctr"/>
             <a:r>
               <a:rPr lang="en-US" sz="400" dirty="0"/>
-              <a:t>( -306, -26)</a:t>
+              <a:t>( -306, -31)</a:t>
             </a:r>
           </a:p>
         </p:txBody>
@@ -5674,7 +5674,7 @@
             <a:pPr algn="ctr"/>
             <a:r>
               <a:rPr lang="en-US" sz="400" dirty="0"/>
-              <a:t>( -380, -26)</a:t>
+              <a:t>( -364, -31)</a:t>
             </a:r>
           </a:p>
         </p:txBody>
@@ -5735,7 +5735,7 @@
             <a:pPr algn="ctr"/>
             <a:r>
               <a:rPr lang="en-US" sz="400" dirty="0"/>
-              <a:t>( -253, -26)</a:t>
+              <a:t>( -248, -31)</a:t>
             </a:r>
           </a:p>
         </p:txBody>
@@ -5796,7 +5796,7 @@
             <a:pPr algn="ctr"/>
             <a:r>
               <a:rPr lang="en-US" sz="400" dirty="0"/>
-              <a:t>( -130, -26)</a:t>
+              <a:t>( -130, -31)</a:t>
             </a:r>
           </a:p>
         </p:txBody>
@@ -5857,7 +5857,7 @@
             <a:pPr algn="ctr"/>
             <a:r>
               <a:rPr lang="en-US" sz="400" dirty="0"/>
-              <a:t>( -186, -26)</a:t>
+              <a:t>( -189, -31)</a:t>
             </a:r>
           </a:p>
         </p:txBody>
@@ -5918,7 +5918,7 @@
             <a:pPr algn="ctr"/>
             <a:r>
               <a:rPr lang="en-US" sz="400" dirty="0"/>
-              <a:t>( 50, -26)</a:t>
+              <a:t>( 45, -31)</a:t>
             </a:r>
           </a:p>
         </p:txBody>
@@ -5979,7 +5979,7 @@
             <a:pPr algn="ctr"/>
             <a:r>
               <a:rPr lang="en-US" sz="400" dirty="0"/>
-              <a:t>( 173, -26)</a:t>
+              <a:t>( 173, -31)</a:t>
             </a:r>
           </a:p>
         </p:txBody>
@@ -6040,7 +6040,7 @@
             <a:pPr algn="ctr"/>
             <a:r>
               <a:rPr lang="en-US" sz="400" dirty="0"/>
-              <a:t>( 106, -26)</a:t>
+              <a:t>( 108, -31)</a:t>
             </a:r>
           </a:p>
         </p:txBody>
@@ -6101,7 +6101,7 @@
             <a:pPr algn="ctr"/>
             <a:r>
               <a:rPr lang="en-US" sz="400" dirty="0"/>
-              <a:t>( 233, -26)</a:t>
+              <a:t>( 230, -31)</a:t>
             </a:r>
           </a:p>
         </p:txBody>
@@ -6162,7 +6162,7 @@
             <a:pPr algn="ctr"/>
             <a:r>
               <a:rPr lang="en-US" sz="400" dirty="0"/>
-              <a:t>( 350, -26)</a:t>
+              <a:t>( 350, -31)</a:t>
             </a:r>
           </a:p>
         </p:txBody>
@@ -6223,7 +6223,7 @@
             <a:pPr algn="ctr"/>
             <a:r>
               <a:rPr lang="en-US" sz="400" dirty="0"/>
-              <a:t>( 293, -26)</a:t>
+              <a:t>( 290, -31)</a:t>
             </a:r>
           </a:p>
         </p:txBody>
@@ -6284,7 +6284,7 @@
             <a:pPr algn="ctr"/>
             <a:r>
               <a:rPr lang="en-US" sz="400" dirty="0"/>
-              <a:t>( 406, -26)</a:t>
+              <a:t>( 406, -31)</a:t>
             </a:r>
           </a:p>
         </p:txBody>
@@ -6345,7 +6345,7 @@
             <a:pPr algn="ctr"/>
             <a:r>
               <a:rPr lang="en-US" sz="400" dirty="0"/>
-              <a:t>( 466, -26)</a:t>
+              <a:t>( 466, -31)</a:t>
             </a:r>
           </a:p>
         </p:txBody>
@@ -6406,7 +6406,7 @@
             <a:pPr algn="ctr"/>
             <a:r>
               <a:rPr lang="en-US" sz="400" dirty="0"/>
-              <a:t>( 526, -26)</a:t>
+              <a:t>( 526, -31)</a:t>
             </a:r>
           </a:p>
         </p:txBody>
@@ -6650,7 +6650,7 @@
             <a:pPr algn="ctr"/>
             <a:r>
               <a:rPr lang="en-US" sz="400" dirty="0"/>
-              <a:t>( -380, 86)</a:t>
+              <a:t>( -364, 86)</a:t>
             </a:r>
           </a:p>
         </p:txBody>
@@ -6711,7 +6711,7 @@
             <a:pPr algn="ctr"/>
             <a:r>
               <a:rPr lang="en-US" sz="400" dirty="0"/>
-              <a:t>( -253, 86)</a:t>
+              <a:t>( -248, 86)</a:t>
             </a:r>
           </a:p>
         </p:txBody>
@@ -6833,7 +6833,7 @@
             <a:pPr algn="ctr"/>
             <a:r>
               <a:rPr lang="en-US" sz="400" dirty="0"/>
-              <a:t>( -186, 86)</a:t>
+              <a:t>( -189, 86)</a:t>
             </a:r>
           </a:p>
         </p:txBody>
@@ -6894,7 +6894,7 @@
             <a:pPr algn="ctr"/>
             <a:r>
               <a:rPr lang="en-US" sz="400" dirty="0"/>
-              <a:t>( 50, 86)</a:t>
+              <a:t>(45, 86)</a:t>
             </a:r>
           </a:p>
         </p:txBody>
@@ -7016,7 +7016,7 @@
             <a:pPr algn="ctr"/>
             <a:r>
               <a:rPr lang="en-US" sz="400" dirty="0"/>
-              <a:t>( 106, 86)</a:t>
+              <a:t>( 108, 86)</a:t>
             </a:r>
           </a:p>
         </p:txBody>
@@ -7077,7 +7077,7 @@
             <a:pPr algn="ctr"/>
             <a:r>
               <a:rPr lang="en-US" sz="400" dirty="0"/>
-              <a:t>( 233, 86)</a:t>
+              <a:t>( 230, 86)</a:t>
             </a:r>
           </a:p>
         </p:txBody>
@@ -7199,7 +7199,7 @@
             <a:pPr algn="ctr"/>
             <a:r>
               <a:rPr lang="en-US" sz="400" dirty="0"/>
-              <a:t>( 293, 86)</a:t>
+              <a:t>( 290, 86)</a:t>
             </a:r>
           </a:p>
         </p:txBody>
@@ -7626,7 +7626,7 @@
             <a:pPr algn="ctr"/>
             <a:r>
               <a:rPr lang="en-US" sz="400" dirty="0"/>
-              <a:t>( -380, 198)</a:t>
+              <a:t>( -364, 198)</a:t>
             </a:r>
           </a:p>
         </p:txBody>
@@ -7687,7 +7687,7 @@
             <a:pPr algn="ctr"/>
             <a:r>
               <a:rPr lang="en-US" sz="400" dirty="0"/>
-              <a:t>( -253, 198)</a:t>
+              <a:t>( -248, 198)</a:t>
             </a:r>
           </a:p>
         </p:txBody>
@@ -7809,7 +7809,7 @@
             <a:pPr algn="ctr"/>
             <a:r>
               <a:rPr lang="en-US" sz="400" dirty="0"/>
-              <a:t>( -186, 198)</a:t>
+              <a:t>( -189, 198)</a:t>
             </a:r>
           </a:p>
         </p:txBody>
@@ -7870,7 +7870,7 @@
             <a:pPr algn="ctr"/>
             <a:r>
               <a:rPr lang="en-US" sz="400" dirty="0"/>
-              <a:t>( 50, 198)</a:t>
+              <a:t>(45, 198)</a:t>
             </a:r>
           </a:p>
         </p:txBody>
@@ -7992,7 +7992,7 @@
             <a:pPr algn="ctr"/>
             <a:r>
               <a:rPr lang="en-US" sz="400" dirty="0"/>
-              <a:t>( 106, 198)</a:t>
+              <a:t>( 108, 198)</a:t>
             </a:r>
           </a:p>
         </p:txBody>
@@ -8053,7 +8053,7 @@
             <a:pPr algn="ctr"/>
             <a:r>
               <a:rPr lang="en-US" sz="400" dirty="0"/>
-              <a:t>( 233, 198)</a:t>
+              <a:t>( 230, 198)</a:t>
             </a:r>
           </a:p>
         </p:txBody>
@@ -8175,7 +8175,7 @@
             <a:pPr algn="ctr"/>
             <a:r>
               <a:rPr lang="en-US" sz="400" dirty="0"/>
-              <a:t>( 293, 198)</a:t>
+              <a:t>( 290, 198)</a:t>
             </a:r>
           </a:p>
         </p:txBody>
@@ -8602,7 +8602,7 @@
             <a:pPr algn="ctr"/>
             <a:r>
               <a:rPr lang="en-US" sz="400" dirty="0"/>
-              <a:t>( -253, 273)</a:t>
+              <a:t>( -248, 273)</a:t>
             </a:r>
           </a:p>
         </p:txBody>
@@ -8724,7 +8724,7 @@
             <a:pPr algn="ctr"/>
             <a:r>
               <a:rPr lang="en-US" sz="400" dirty="0"/>
-              <a:t>( -186, 273)</a:t>
+              <a:t>( -189, 273)</a:t>
             </a:r>
           </a:p>
         </p:txBody>
@@ -8785,7 +8785,7 @@
             <a:pPr algn="ctr"/>
             <a:r>
               <a:rPr lang="en-US" sz="400" dirty="0"/>
-              <a:t>( 50, 273)</a:t>
+              <a:t>(45, 273)</a:t>
             </a:r>
           </a:p>
         </p:txBody>
@@ -8907,7 +8907,7 @@
             <a:pPr algn="ctr"/>
             <a:r>
               <a:rPr lang="en-US" sz="400" dirty="0"/>
-              <a:t>( 106, 273)</a:t>
+              <a:t>( 108, 273)</a:t>
             </a:r>
           </a:p>
         </p:txBody>
@@ -8968,7 +8968,7 @@
             <a:pPr algn="ctr"/>
             <a:r>
               <a:rPr lang="en-US" sz="400" dirty="0"/>
-              <a:t>( 233, 273)</a:t>
+              <a:t>( 230, 273)</a:t>
             </a:r>
           </a:p>
         </p:txBody>
@@ -9090,7 +9090,7 @@
             <a:pPr algn="ctr"/>
             <a:r>
               <a:rPr lang="en-US" sz="400" dirty="0"/>
-              <a:t>( 293, 273)</a:t>
+              <a:t>( 290, 273)</a:t>
             </a:r>
           </a:p>
         </p:txBody>
@@ -9395,7 +9395,7 @@
             <a:pPr algn="ctr"/>
             <a:r>
               <a:rPr lang="en-US" sz="400" dirty="0"/>
-              <a:t>( -380, 273)</a:t>
+              <a:t>( -364, 273)</a:t>
             </a:r>
           </a:p>
         </p:txBody>
@@ -9680,7 +9680,7 @@
             <a:pPr algn="ctr"/>
             <a:r>
               <a:rPr lang="en-US" sz="400" dirty="0"/>
-              <a:t>( -583, -26)</a:t>
+              <a:t>( -583, -25)</a:t>
             </a:r>
           </a:p>
         </p:txBody>
@@ -9908,7 +9908,7 @@
             <a:pPr algn="ctr"/>
             <a:r>
               <a:rPr lang="en-US" sz="400" dirty="0"/>
-              <a:t>( -380, -137)</a:t>
+              <a:t>( -364, -137)</a:t>
             </a:r>
           </a:p>
         </p:txBody>
@@ -9965,7 +9965,7 @@
             <a:pPr algn="ctr"/>
             <a:r>
               <a:rPr lang="en-US" sz="400" dirty="0"/>
-              <a:t>( -253, -137)</a:t>
+              <a:t>( -248, -137)</a:t>
             </a:r>
           </a:p>
         </p:txBody>
@@ -10079,7 +10079,7 @@
             <a:pPr algn="ctr"/>
             <a:r>
               <a:rPr lang="en-US" sz="400" dirty="0"/>
-              <a:t>( -186, -137)</a:t>
+              <a:t>( -189, -137)</a:t>
             </a:r>
           </a:p>
         </p:txBody>
@@ -10136,7 +10136,7 @@
             <a:pPr algn="ctr"/>
             <a:r>
               <a:rPr lang="en-US" sz="400" dirty="0"/>
-              <a:t>( 50, -137)</a:t>
+              <a:t>( 45, -137)</a:t>
             </a:r>
           </a:p>
         </p:txBody>
@@ -10250,7 +10250,7 @@
             <a:pPr algn="ctr"/>
             <a:r>
               <a:rPr lang="en-US" sz="400" dirty="0"/>
-              <a:t>( 106, -137)</a:t>
+              <a:t>( 108, -137)</a:t>
             </a:r>
           </a:p>
         </p:txBody>
@@ -10307,7 +10307,7 @@
             <a:pPr algn="ctr"/>
             <a:r>
               <a:rPr lang="en-US" sz="400" dirty="0"/>
-              <a:t>( 233, -137)</a:t>
+              <a:t>( 230, -137)</a:t>
             </a:r>
           </a:p>
         </p:txBody>
@@ -10421,7 +10421,7 @@
             <a:pPr algn="ctr"/>
             <a:r>
               <a:rPr lang="en-US" sz="400" dirty="0"/>
-              <a:t>( 293, -137)</a:t>
+              <a:t>( 290, -137)</a:t>
             </a:r>
           </a:p>
         </p:txBody>
@@ -10820,7 +10820,7 @@
             <a:pPr algn="ctr"/>
             <a:r>
               <a:rPr lang="en-US" sz="400" dirty="0"/>
-              <a:t>( -380, -252)</a:t>
+              <a:t>( -364, -252)</a:t>
             </a:r>
           </a:p>
         </p:txBody>
@@ -10934,7 +10934,7 @@
             <a:pPr algn="ctr"/>
             <a:r>
               <a:rPr lang="en-US" sz="400" dirty="0"/>
-              <a:t>( -186, -252)</a:t>
+              <a:t>( -189, -252)</a:t>
             </a:r>
           </a:p>
         </p:txBody>
@@ -10991,7 +10991,7 @@
             <a:pPr algn="ctr"/>
             <a:r>
               <a:rPr lang="en-US" sz="400" dirty="0"/>
-              <a:t>( 50, -252)</a:t>
+              <a:t>( 45, -252)</a:t>
             </a:r>
           </a:p>
         </p:txBody>
@@ -11105,7 +11105,7 @@
             <a:pPr algn="ctr"/>
             <a:r>
               <a:rPr lang="en-US" sz="400" dirty="0"/>
-              <a:t>( 106, -252)</a:t>
+              <a:t>( 108, -252)</a:t>
             </a:r>
           </a:p>
         </p:txBody>
@@ -11162,7 +11162,7 @@
             <a:pPr algn="ctr"/>
             <a:r>
               <a:rPr lang="en-US" sz="400" dirty="0"/>
-              <a:t>( 233, -252)</a:t>
+              <a:t>( 230, -252)</a:t>
             </a:r>
           </a:p>
         </p:txBody>
@@ -11276,7 +11276,7 @@
             <a:pPr algn="ctr"/>
             <a:r>
               <a:rPr lang="en-US" sz="400" dirty="0"/>
-              <a:t>( 293, -252)</a:t>
+              <a:t>( 290, -252)</a:t>
             </a:r>
           </a:p>
         </p:txBody>
@@ -11333,7 +11333,7 @@
             <a:pPr algn="ctr"/>
             <a:r>
               <a:rPr lang="en-US" sz="400" dirty="0"/>
-              <a:t>( -486, -26)</a:t>
+              <a:t>( -486, -25)</a:t>
             </a:r>
           </a:p>
         </p:txBody>
@@ -11390,7 +11390,7 @@
             <a:pPr algn="ctr"/>
             <a:r>
               <a:rPr lang="en-US" sz="400" dirty="0"/>
-              <a:t>( -426, -26)</a:t>
+              <a:t>( -426, -25)</a:t>
             </a:r>
           </a:p>
         </p:txBody>
@@ -11447,7 +11447,7 @@
             <a:pPr algn="ctr"/>
             <a:r>
               <a:rPr lang="en-US" sz="400" dirty="0"/>
-              <a:t>( -306, -26)</a:t>
+              <a:t>( -306, -25)</a:t>
             </a:r>
           </a:p>
         </p:txBody>
@@ -11504,7 +11504,7 @@
             <a:pPr algn="ctr"/>
             <a:r>
               <a:rPr lang="en-US" sz="400" dirty="0"/>
-              <a:t>( -380, -26)</a:t>
+              <a:t>( -364, -25)</a:t>
             </a:r>
           </a:p>
         </p:txBody>
@@ -11561,7 +11561,7 @@
             <a:pPr algn="ctr"/>
             <a:r>
               <a:rPr lang="en-US" sz="400" dirty="0"/>
-              <a:t>( -253, -26)</a:t>
+              <a:t>( -248, -25)</a:t>
             </a:r>
           </a:p>
         </p:txBody>
@@ -11618,7 +11618,7 @@
             <a:pPr algn="ctr"/>
             <a:r>
               <a:rPr lang="en-US" sz="400" dirty="0"/>
-              <a:t>( -130, -26)</a:t>
+              <a:t>( -130, -25)</a:t>
             </a:r>
           </a:p>
         </p:txBody>
@@ -11675,7 +11675,7 @@
             <a:pPr algn="ctr"/>
             <a:r>
               <a:rPr lang="en-US" sz="400" dirty="0"/>
-              <a:t>( -186, -26)</a:t>
+              <a:t>( -189, -25)</a:t>
             </a:r>
           </a:p>
         </p:txBody>
@@ -11732,7 +11732,7 @@
             <a:pPr algn="ctr"/>
             <a:r>
               <a:rPr lang="en-US" sz="400" dirty="0"/>
-              <a:t>( 50, -26)</a:t>
+              <a:t>( 45, -25)</a:t>
             </a:r>
           </a:p>
         </p:txBody>
@@ -11789,7 +11789,7 @@
             <a:pPr algn="ctr"/>
             <a:r>
               <a:rPr lang="en-US" sz="400" dirty="0"/>
-              <a:t>( 173, -26)</a:t>
+              <a:t>( 173, -25)</a:t>
             </a:r>
           </a:p>
         </p:txBody>
@@ -11846,7 +11846,7 @@
             <a:pPr algn="ctr"/>
             <a:r>
               <a:rPr lang="en-US" sz="400" dirty="0"/>
-              <a:t>( 106, -26)</a:t>
+              <a:t>( 108, -25)</a:t>
             </a:r>
           </a:p>
         </p:txBody>
@@ -11903,7 +11903,7 @@
             <a:pPr algn="ctr"/>
             <a:r>
               <a:rPr lang="en-US" sz="400" dirty="0"/>
-              <a:t>( 233, -26)</a:t>
+              <a:t>( 230, -25)</a:t>
             </a:r>
           </a:p>
         </p:txBody>
@@ -11960,7 +11960,7 @@
             <a:pPr algn="ctr"/>
             <a:r>
               <a:rPr lang="en-US" sz="400" dirty="0"/>
-              <a:t>( 350, -26)</a:t>
+              <a:t>( 350, -25)</a:t>
             </a:r>
           </a:p>
         </p:txBody>
@@ -12017,7 +12017,7 @@
             <a:pPr algn="ctr"/>
             <a:r>
               <a:rPr lang="en-US" sz="400" dirty="0"/>
-              <a:t>( 293, -26)</a:t>
+              <a:t>( 290, -25)</a:t>
             </a:r>
           </a:p>
         </p:txBody>
@@ -12074,7 +12074,7 @@
             <a:pPr algn="ctr"/>
             <a:r>
               <a:rPr lang="en-US" sz="400" dirty="0"/>
-              <a:t>( 406, -26)</a:t>
+              <a:t>( 406, -25)</a:t>
             </a:r>
           </a:p>
         </p:txBody>
@@ -12131,7 +12131,7 @@
             <a:pPr algn="ctr"/>
             <a:r>
               <a:rPr lang="en-US" sz="400" dirty="0"/>
-              <a:t>( 466, -26)</a:t>
+              <a:t>( 466, -25)</a:t>
             </a:r>
           </a:p>
         </p:txBody>
@@ -12188,7 +12188,7 @@
             <a:pPr algn="ctr"/>
             <a:r>
               <a:rPr lang="en-US" sz="400" dirty="0"/>
-              <a:t>( 526, -26)</a:t>
+              <a:t>( 526, -25)</a:t>
             </a:r>
           </a:p>
         </p:txBody>
@@ -12416,7 +12416,7 @@
             <a:pPr algn="ctr"/>
             <a:r>
               <a:rPr lang="en-US" sz="400" dirty="0"/>
-              <a:t>( -380, 86)</a:t>
+              <a:t>( -364, 86)</a:t>
             </a:r>
           </a:p>
         </p:txBody>
@@ -12473,7 +12473,7 @@
             <a:pPr algn="ctr"/>
             <a:r>
               <a:rPr lang="en-US" sz="400" dirty="0"/>
-              <a:t>( -253, 86)</a:t>
+              <a:t>( -248, 86)</a:t>
             </a:r>
           </a:p>
         </p:txBody>
@@ -12587,7 +12587,7 @@
             <a:pPr algn="ctr"/>
             <a:r>
               <a:rPr lang="en-US" sz="400" dirty="0"/>
-              <a:t>( -186, 86)</a:t>
+              <a:t>( -189, 86)</a:t>
             </a:r>
           </a:p>
         </p:txBody>
@@ -12644,7 +12644,7 @@
             <a:pPr algn="ctr"/>
             <a:r>
               <a:rPr lang="en-US" sz="400" dirty="0"/>
-              <a:t>( 50, 86)</a:t>
+              <a:t>(45, 86)</a:t>
             </a:r>
           </a:p>
         </p:txBody>
@@ -12758,7 +12758,7 @@
             <a:pPr algn="ctr"/>
             <a:r>
               <a:rPr lang="en-US" sz="400" dirty="0"/>
-              <a:t>( 106, 86)</a:t>
+              <a:t>( 108, 86)</a:t>
             </a:r>
           </a:p>
         </p:txBody>
@@ -12815,7 +12815,7 @@
             <a:pPr algn="ctr"/>
             <a:r>
               <a:rPr lang="en-US" sz="400" dirty="0"/>
-              <a:t>( 233, 86)</a:t>
+              <a:t>( 230, 86)</a:t>
             </a:r>
           </a:p>
         </p:txBody>
@@ -12929,7 +12929,7 @@
             <a:pPr algn="ctr"/>
             <a:r>
               <a:rPr lang="en-US" sz="400" dirty="0"/>
-              <a:t>( 293, 86)</a:t>
+              <a:t>( 290, 86)</a:t>
             </a:r>
           </a:p>
         </p:txBody>
@@ -13328,7 +13328,7 @@
             <a:pPr algn="ctr"/>
             <a:r>
               <a:rPr lang="en-US" sz="400" dirty="0"/>
-              <a:t>( -380, 198)</a:t>
+              <a:t>( -364, 198)</a:t>
             </a:r>
           </a:p>
         </p:txBody>
@@ -13385,7 +13385,7 @@
             <a:pPr algn="ctr"/>
             <a:r>
               <a:rPr lang="en-US" sz="400" dirty="0"/>
-              <a:t>( -253, 198)</a:t>
+              <a:t>( -248, 198)</a:t>
             </a:r>
           </a:p>
         </p:txBody>
@@ -13499,7 +13499,7 @@
             <a:pPr algn="ctr"/>
             <a:r>
               <a:rPr lang="en-US" sz="400" dirty="0"/>
-              <a:t>( -186, 198)</a:t>
+              <a:t>( -189, 198)</a:t>
             </a:r>
           </a:p>
         </p:txBody>
@@ -13556,7 +13556,7 @@
             <a:pPr algn="ctr"/>
             <a:r>
               <a:rPr lang="en-US" sz="400" dirty="0"/>
-              <a:t>( 50, 198)</a:t>
+              <a:t>(45, 198)</a:t>
             </a:r>
           </a:p>
         </p:txBody>
@@ -13670,7 +13670,7 @@
             <a:pPr algn="ctr"/>
             <a:r>
               <a:rPr lang="en-US" sz="400" dirty="0"/>
-              <a:t>( 106, 198)</a:t>
+              <a:t>( 108, 198)</a:t>
             </a:r>
           </a:p>
         </p:txBody>
@@ -13727,7 +13727,7 @@
             <a:pPr algn="ctr"/>
             <a:r>
               <a:rPr lang="en-US" sz="400" dirty="0"/>
-              <a:t>( 233, 198)</a:t>
+              <a:t>( 230, 198)</a:t>
             </a:r>
           </a:p>
         </p:txBody>
@@ -13841,7 +13841,7 @@
             <a:pPr algn="ctr"/>
             <a:r>
               <a:rPr lang="en-US" sz="400" dirty="0"/>
-              <a:t>( 293, 198)</a:t>
+              <a:t>( 290, 198)</a:t>
             </a:r>
           </a:p>
         </p:txBody>
@@ -14073,7 +14073,7 @@
             <a:pPr algn="ctr"/>
             <a:r>
               <a:rPr lang="en-US" sz="400" dirty="0"/>
-              <a:t>( 576, -143)</a:t>
+              <a:t>( 583, -143)</a:t>
             </a:r>
           </a:p>
         </p:txBody>
@@ -14134,7 +14134,7 @@
             <a:pPr algn="ctr"/>
             <a:r>
               <a:rPr lang="en-US" sz="400" dirty="0"/>
-              <a:t>( 576, -26)</a:t>
+              <a:t>( 583, -31)</a:t>
             </a:r>
           </a:p>
         </p:txBody>
@@ -14195,7 +14195,7 @@
             <a:pPr algn="ctr"/>
             <a:r>
               <a:rPr lang="en-US" sz="400" dirty="0"/>
-              <a:t>( 576, 86)</a:t>
+              <a:t>( 583, 86)</a:t>
             </a:r>
           </a:p>
         </p:txBody>
@@ -14256,7 +14256,7 @@
             <a:pPr algn="ctr"/>
             <a:r>
               <a:rPr lang="en-US" sz="400" dirty="0"/>
-              <a:t>( 576, 198)</a:t>
+              <a:t>( 583, 198)</a:t>
             </a:r>
           </a:p>
         </p:txBody>
@@ -14313,7 +14313,7 @@
             <a:pPr algn="ctr"/>
             <a:r>
               <a:rPr lang="en-US" sz="400" dirty="0"/>
-              <a:t>( 576, -137)</a:t>
+              <a:t>( 583, -137)</a:t>
             </a:r>
           </a:p>
         </p:txBody>
@@ -14370,7 +14370,7 @@
             <a:pPr algn="ctr"/>
             <a:r>
               <a:rPr lang="en-US" sz="400" dirty="0"/>
-              <a:t>( 576, -26)</a:t>
+              <a:t>( 583, -25)</a:t>
             </a:r>
           </a:p>
         </p:txBody>
@@ -14427,7 +14427,7 @@
             <a:pPr algn="ctr"/>
             <a:r>
               <a:rPr lang="en-US" sz="400" dirty="0"/>
-              <a:t>( 576, 86)</a:t>
+              <a:t>( 583, 86)</a:t>
             </a:r>
           </a:p>
         </p:txBody>
@@ -14484,7 +14484,7 @@
             <a:pPr algn="ctr"/>
             <a:r>
               <a:rPr lang="en-US" sz="400" dirty="0"/>
-              <a:t>( 576, 198)</a:t>
+              <a:t>( 583, 198)</a:t>
             </a:r>
           </a:p>
         </p:txBody>

</xml_diff>

<commit_message>
theird line of graph
</commit_message>
<xml_diff>
--- a/src/background/vertex_map.pptx
+++ b/src/background/vertex_map.pptx
@@ -3783,7 +3783,7 @@
             <a:pPr algn="ctr"/>
             <a:r>
               <a:rPr lang="en-US" sz="400" dirty="0"/>
-              <a:t>( -583, 86)</a:t>
+              <a:t>( -583, 81)</a:t>
             </a:r>
           </a:p>
         </p:txBody>
@@ -6467,7 +6467,7 @@
             <a:pPr algn="ctr"/>
             <a:r>
               <a:rPr lang="en-US" sz="400" dirty="0"/>
-              <a:t>( -486, 86)</a:t>
+              <a:t>( -486, 81)</a:t>
             </a:r>
           </a:p>
         </p:txBody>
@@ -6528,7 +6528,7 @@
             <a:pPr algn="ctr"/>
             <a:r>
               <a:rPr lang="en-US" sz="400" dirty="0"/>
-              <a:t>( -426,86)</a:t>
+              <a:t>( -426,81)</a:t>
             </a:r>
           </a:p>
         </p:txBody>
@@ -6589,7 +6589,7 @@
             <a:pPr algn="ctr"/>
             <a:r>
               <a:rPr lang="en-US" sz="400" dirty="0"/>
-              <a:t>( -306, 86)</a:t>
+              <a:t>( -306, 81)</a:t>
             </a:r>
           </a:p>
         </p:txBody>
@@ -6650,7 +6650,7 @@
             <a:pPr algn="ctr"/>
             <a:r>
               <a:rPr lang="en-US" sz="400" dirty="0"/>
-              <a:t>( -364, 86)</a:t>
+              <a:t>( -364, 81)</a:t>
             </a:r>
           </a:p>
         </p:txBody>
@@ -6711,7 +6711,7 @@
             <a:pPr algn="ctr"/>
             <a:r>
               <a:rPr lang="en-US" sz="400" dirty="0"/>
-              <a:t>( -248, 86)</a:t>
+              <a:t>( -248, 81)</a:t>
             </a:r>
           </a:p>
         </p:txBody>
@@ -6772,7 +6772,7 @@
             <a:pPr algn="ctr"/>
             <a:r>
               <a:rPr lang="en-US" sz="400" dirty="0"/>
-              <a:t>( -130, 86)</a:t>
+              <a:t>( -130, 81)</a:t>
             </a:r>
           </a:p>
         </p:txBody>
@@ -6833,7 +6833,7 @@
             <a:pPr algn="ctr"/>
             <a:r>
               <a:rPr lang="en-US" sz="400" dirty="0"/>
-              <a:t>( -189, 86)</a:t>
+              <a:t>( -189, 81)</a:t>
             </a:r>
           </a:p>
         </p:txBody>
@@ -6894,7 +6894,7 @@
             <a:pPr algn="ctr"/>
             <a:r>
               <a:rPr lang="en-US" sz="400" dirty="0"/>
-              <a:t>(45, 86)</a:t>
+              <a:t>(45, 81)</a:t>
             </a:r>
           </a:p>
         </p:txBody>
@@ -6955,7 +6955,7 @@
             <a:pPr algn="ctr"/>
             <a:r>
               <a:rPr lang="en-US" sz="400" dirty="0"/>
-              <a:t>( 173, 86)</a:t>
+              <a:t>( 173, 81)</a:t>
             </a:r>
           </a:p>
         </p:txBody>
@@ -7016,7 +7016,7 @@
             <a:pPr algn="ctr"/>
             <a:r>
               <a:rPr lang="en-US" sz="400" dirty="0"/>
-              <a:t>( 108, 86)</a:t>
+              <a:t>( 108, 81)</a:t>
             </a:r>
           </a:p>
         </p:txBody>
@@ -7077,7 +7077,7 @@
             <a:pPr algn="ctr"/>
             <a:r>
               <a:rPr lang="en-US" sz="400" dirty="0"/>
-              <a:t>( 230, 86)</a:t>
+              <a:t>( 230, 81)</a:t>
             </a:r>
           </a:p>
         </p:txBody>
@@ -7138,7 +7138,7 @@
             <a:pPr algn="ctr"/>
             <a:r>
               <a:rPr lang="en-US" sz="400" dirty="0"/>
-              <a:t>( 350, 86)</a:t>
+              <a:t>( 350, 81)</a:t>
             </a:r>
           </a:p>
         </p:txBody>
@@ -7199,7 +7199,7 @@
             <a:pPr algn="ctr"/>
             <a:r>
               <a:rPr lang="en-US" sz="400" dirty="0"/>
-              <a:t>( 290, 86)</a:t>
+              <a:t>( 290, 81)</a:t>
             </a:r>
           </a:p>
         </p:txBody>
@@ -7260,7 +7260,7 @@
             <a:pPr algn="ctr"/>
             <a:r>
               <a:rPr lang="en-US" sz="400" dirty="0"/>
-              <a:t>( 406, 86)</a:t>
+              <a:t>( 406, 81)</a:t>
             </a:r>
           </a:p>
         </p:txBody>
@@ -7321,7 +7321,7 @@
             <a:pPr algn="ctr"/>
             <a:r>
               <a:rPr lang="en-US" sz="400" dirty="0"/>
-              <a:t>( 466, 86)</a:t>
+              <a:t>( 466, 81)</a:t>
             </a:r>
           </a:p>
         </p:txBody>
@@ -7382,7 +7382,7 @@
             <a:pPr algn="ctr"/>
             <a:r>
               <a:rPr lang="en-US" sz="400" dirty="0"/>
-              <a:t>( 526, 86)</a:t>
+              <a:t>( 526, 81)</a:t>
             </a:r>
           </a:p>
         </p:txBody>
@@ -9737,7 +9737,7 @@
             <a:pPr algn="ctr"/>
             <a:r>
               <a:rPr lang="en-US" sz="400" dirty="0"/>
-              <a:t>( -583, 86)</a:t>
+              <a:t>( -583, 87)</a:t>
             </a:r>
           </a:p>
         </p:txBody>
@@ -12245,7 +12245,7 @@
             <a:pPr algn="ctr"/>
             <a:r>
               <a:rPr lang="en-US" sz="400" dirty="0"/>
-              <a:t>( -486, 86)</a:t>
+              <a:t>( -486, 87)</a:t>
             </a:r>
           </a:p>
         </p:txBody>
@@ -12302,7 +12302,7 @@
             <a:pPr algn="ctr"/>
             <a:r>
               <a:rPr lang="en-US" sz="400" dirty="0"/>
-              <a:t>( -426,86)</a:t>
+              <a:t>( -426,87)</a:t>
             </a:r>
           </a:p>
         </p:txBody>
@@ -12359,7 +12359,7 @@
             <a:pPr algn="ctr"/>
             <a:r>
               <a:rPr lang="en-US" sz="400" dirty="0"/>
-              <a:t>( -306, 86)</a:t>
+              <a:t>( -306, 87)</a:t>
             </a:r>
           </a:p>
         </p:txBody>
@@ -12416,7 +12416,7 @@
             <a:pPr algn="ctr"/>
             <a:r>
               <a:rPr lang="en-US" sz="400" dirty="0"/>
-              <a:t>( -364, 86)</a:t>
+              <a:t>( -364, 87)</a:t>
             </a:r>
           </a:p>
         </p:txBody>
@@ -12473,7 +12473,7 @@
             <a:pPr algn="ctr"/>
             <a:r>
               <a:rPr lang="en-US" sz="400" dirty="0"/>
-              <a:t>( -248, 86)</a:t>
+              <a:t>( -248, 87)</a:t>
             </a:r>
           </a:p>
         </p:txBody>
@@ -12530,7 +12530,7 @@
             <a:pPr algn="ctr"/>
             <a:r>
               <a:rPr lang="en-US" sz="400" dirty="0"/>
-              <a:t>( -130, 86)</a:t>
+              <a:t>( -130, 87)</a:t>
             </a:r>
           </a:p>
         </p:txBody>
@@ -12587,7 +12587,7 @@
             <a:pPr algn="ctr"/>
             <a:r>
               <a:rPr lang="en-US" sz="400" dirty="0"/>
-              <a:t>( -189, 86)</a:t>
+              <a:t>( -189, 87)</a:t>
             </a:r>
           </a:p>
         </p:txBody>
@@ -12644,7 +12644,7 @@
             <a:pPr algn="ctr"/>
             <a:r>
               <a:rPr lang="en-US" sz="400" dirty="0"/>
-              <a:t>(45, 86)</a:t>
+              <a:t>(45, 87)</a:t>
             </a:r>
           </a:p>
         </p:txBody>
@@ -12701,7 +12701,7 @@
             <a:pPr algn="ctr"/>
             <a:r>
               <a:rPr lang="en-US" sz="400" dirty="0"/>
-              <a:t>( 173, 86)</a:t>
+              <a:t>( 173, 87)</a:t>
             </a:r>
           </a:p>
         </p:txBody>
@@ -12758,7 +12758,7 @@
             <a:pPr algn="ctr"/>
             <a:r>
               <a:rPr lang="en-US" sz="400" dirty="0"/>
-              <a:t>( 108, 86)</a:t>
+              <a:t>( 108, 87)</a:t>
             </a:r>
           </a:p>
         </p:txBody>
@@ -12815,7 +12815,7 @@
             <a:pPr algn="ctr"/>
             <a:r>
               <a:rPr lang="en-US" sz="400" dirty="0"/>
-              <a:t>( 230, 86)</a:t>
+              <a:t>( 230, 87)</a:t>
             </a:r>
           </a:p>
         </p:txBody>
@@ -12872,7 +12872,7 @@
             <a:pPr algn="ctr"/>
             <a:r>
               <a:rPr lang="en-US" sz="400" dirty="0"/>
-              <a:t>( 350, 86)</a:t>
+              <a:t>( 350, 87)</a:t>
             </a:r>
           </a:p>
         </p:txBody>
@@ -12929,7 +12929,7 @@
             <a:pPr algn="ctr"/>
             <a:r>
               <a:rPr lang="en-US" sz="400" dirty="0"/>
-              <a:t>( 290, 86)</a:t>
+              <a:t>( 290, 87)</a:t>
             </a:r>
           </a:p>
         </p:txBody>
@@ -12986,7 +12986,7 @@
             <a:pPr algn="ctr"/>
             <a:r>
               <a:rPr lang="en-US" sz="400" dirty="0"/>
-              <a:t>( 406, 86)</a:t>
+              <a:t>( 406, 87)</a:t>
             </a:r>
           </a:p>
         </p:txBody>
@@ -13043,7 +13043,7 @@
             <a:pPr algn="ctr"/>
             <a:r>
               <a:rPr lang="en-US" sz="400" dirty="0"/>
-              <a:t>( 466, 86)</a:t>
+              <a:t>( 466, 87)</a:t>
             </a:r>
           </a:p>
         </p:txBody>
@@ -13100,7 +13100,7 @@
             <a:pPr algn="ctr"/>
             <a:r>
               <a:rPr lang="en-US" sz="400" dirty="0"/>
-              <a:t>( 526, 86)</a:t>
+              <a:t>( 526, 87)</a:t>
             </a:r>
           </a:p>
         </p:txBody>
@@ -14195,7 +14195,7 @@
             <a:pPr algn="ctr"/>
             <a:r>
               <a:rPr lang="en-US" sz="400" dirty="0"/>
-              <a:t>( 583, 86)</a:t>
+              <a:t>( 583, 81)</a:t>
             </a:r>
           </a:p>
         </p:txBody>
@@ -14427,7 +14427,7 @@
             <a:pPr algn="ctr"/>
             <a:r>
               <a:rPr lang="en-US" sz="400" dirty="0"/>
-              <a:t>( 583, 86)</a:t>
+              <a:t>( 583, 87)</a:t>
             </a:r>
           </a:p>
         </p:txBody>

</xml_diff>